<commit_message>
add missing materials from 5th lesson
</commit_message>
<xml_diff>
--- a/002 - setup env/002_Setup_env - presentation.pptx
+++ b/002 - setup env/002_Setup_env - presentation.pptx
@@ -273,7 +273,7 @@
               <a:pPr>
                 <a:defRPr/>
               </a:pPr>
-              <a:t>27-Feb-17</a:t>
+              <a:t>26-Apr-17</a:t>
             </a:fld>
             <a:endParaRPr lang="en-US"/>
           </a:p>
@@ -1706,7 +1706,7 @@
               <a:pPr>
                 <a:defRPr/>
               </a:pPr>
-              <a:t>27.02.2017</a:t>
+              <a:t>26.04.2017</a:t>
             </a:fld>
             <a:endParaRPr lang="ru-RU"/>
           </a:p>
@@ -1896,7 +1896,7 @@
               <a:pPr>
                 <a:defRPr/>
               </a:pPr>
-              <a:t>27.02.2017</a:t>
+              <a:t>26.04.2017</a:t>
             </a:fld>
             <a:endParaRPr lang="ru-RU"/>
           </a:p>
@@ -2096,7 +2096,7 @@
               <a:pPr>
                 <a:defRPr/>
               </a:pPr>
-              <a:t>27.02.2017</a:t>
+              <a:t>26.04.2017</a:t>
             </a:fld>
             <a:endParaRPr lang="ru-RU"/>
           </a:p>
@@ -2397,7 +2397,7 @@
                 <a:tabLst/>
                 <a:defRPr/>
               </a:pPr>
-              <a:t>27.02.2017</a:t>
+              <a:t>26.04.2017</a:t>
             </a:fld>
             <a:endParaRPr kumimoji="0" lang="ru-RU" sz="1200" b="0" i="0" u="none" strike="noStrike" kern="1200" cap="none" spc="0" normalizeH="0" baseline="0" noProof="0">
               <a:ln>
@@ -2728,7 +2728,7 @@
                 <a:tabLst/>
                 <a:defRPr/>
               </a:pPr>
-              <a:t>27.02.2017</a:t>
+              <a:t>26.04.2017</a:t>
             </a:fld>
             <a:endParaRPr kumimoji="0" lang="ru-RU" sz="1200" b="0" i="0" u="none" strike="noStrike" kern="1200" cap="none" spc="0" normalizeH="0" baseline="0" noProof="0">
               <a:ln>
@@ -3136,7 +3136,7 @@
                 <a:tabLst/>
                 <a:defRPr/>
               </a:pPr>
-              <a:t>27.02.2017</a:t>
+              <a:t>26.04.2017</a:t>
             </a:fld>
             <a:endParaRPr kumimoji="0" lang="ru-RU" sz="1200" b="0" i="0" u="none" strike="noStrike" kern="1200" cap="none" spc="0" normalizeH="0" baseline="0" noProof="0">
               <a:ln>
@@ -3584,7 +3584,7 @@
                 <a:tabLst/>
                 <a:defRPr/>
               </a:pPr>
-              <a:t>27.02.2017</a:t>
+              <a:t>26.04.2017</a:t>
             </a:fld>
             <a:endParaRPr kumimoji="0" lang="ru-RU" sz="1200" b="0" i="0" u="none" strike="noStrike" kern="1200" cap="none" spc="0" normalizeH="0" baseline="0" noProof="0">
               <a:ln>
@@ -4166,7 +4166,7 @@
                 <a:tabLst/>
                 <a:defRPr/>
               </a:pPr>
-              <a:t>27.02.2017</a:t>
+              <a:t>26.04.2017</a:t>
             </a:fld>
             <a:endParaRPr kumimoji="0" lang="ru-RU" sz="1200" b="0" i="0" u="none" strike="noStrike" kern="1200" cap="none" spc="0" normalizeH="0" baseline="0" noProof="0">
               <a:ln>
@@ -4446,7 +4446,7 @@
                 <a:tabLst/>
                 <a:defRPr/>
               </a:pPr>
-              <a:t>27.02.2017</a:t>
+              <a:t>26.04.2017</a:t>
             </a:fld>
             <a:endParaRPr kumimoji="0" lang="ru-RU" sz="1200" b="0" i="0" u="none" strike="noStrike" kern="1200" cap="none" spc="0" normalizeH="0" baseline="0" noProof="0">
               <a:ln>
@@ -4704,7 +4704,7 @@
                 <a:tabLst/>
                 <a:defRPr/>
               </a:pPr>
-              <a:t>27.02.2017</a:t>
+              <a:t>26.04.2017</a:t>
             </a:fld>
             <a:endParaRPr kumimoji="0" lang="ru-RU" sz="1200" b="0" i="0" u="none" strike="noStrike" kern="1200" cap="none" spc="0" normalizeH="0" baseline="0" noProof="0">
               <a:ln>
@@ -5142,7 +5142,7 @@
                 <a:tabLst/>
                 <a:defRPr/>
               </a:pPr>
-              <a:t>27.02.2017</a:t>
+              <a:t>26.04.2017</a:t>
             </a:fld>
             <a:endParaRPr kumimoji="0" lang="ru-RU" sz="1200" b="0" i="0" u="none" strike="noStrike" kern="1200" cap="none" spc="0" normalizeH="0" baseline="0" noProof="0">
               <a:ln>
@@ -5434,7 +5434,7 @@
               <a:pPr>
                 <a:defRPr/>
               </a:pPr>
-              <a:t>27.02.2017</a:t>
+              <a:t>26.04.2017</a:t>
             </a:fld>
             <a:endParaRPr lang="ru-RU"/>
           </a:p>
@@ -5750,7 +5750,7 @@
                 <a:tabLst/>
                 <a:defRPr/>
               </a:pPr>
-              <a:t>27.02.2017</a:t>
+              <a:t>26.04.2017</a:t>
             </a:fld>
             <a:endParaRPr kumimoji="0" lang="ru-RU" sz="1200" b="0" i="0" u="none" strike="noStrike" kern="1200" cap="none" spc="0" normalizeH="0" baseline="0" noProof="0">
               <a:ln>
@@ -6081,7 +6081,7 @@
                 <a:tabLst/>
                 <a:defRPr/>
               </a:pPr>
-              <a:t>27.02.2017</a:t>
+              <a:t>26.04.2017</a:t>
             </a:fld>
             <a:endParaRPr kumimoji="0" lang="ru-RU" sz="1200" b="0" i="0" u="none" strike="noStrike" kern="1200" cap="none" spc="0" normalizeH="0" baseline="0" noProof="0">
               <a:ln>
@@ -6422,7 +6422,7 @@
                 <a:tabLst/>
                 <a:defRPr/>
               </a:pPr>
-              <a:t>27.02.2017</a:t>
+              <a:t>26.04.2017</a:t>
             </a:fld>
             <a:endParaRPr kumimoji="0" lang="ru-RU" sz="1200" b="0" i="0" u="none" strike="noStrike" kern="1200" cap="none" spc="0" normalizeH="0" baseline="0" noProof="0">
               <a:ln>
@@ -6791,7 +6791,7 @@
               <a:pPr>
                 <a:defRPr/>
               </a:pPr>
-              <a:t>27.02.2017</a:t>
+              <a:t>26.04.2017</a:t>
             </a:fld>
             <a:endParaRPr lang="ru-RU"/>
           </a:p>
@@ -7098,7 +7098,7 @@
               <a:pPr>
                 <a:defRPr/>
               </a:pPr>
-              <a:t>27.02.2017</a:t>
+              <a:t>26.04.2017</a:t>
             </a:fld>
             <a:endParaRPr lang="ru-RU"/>
           </a:p>
@@ -7539,7 +7539,7 @@
               <a:pPr>
                 <a:defRPr/>
               </a:pPr>
-              <a:t>27.02.2017</a:t>
+              <a:t>26.04.2017</a:t>
             </a:fld>
             <a:endParaRPr lang="ru-RU"/>
           </a:p>
@@ -7678,7 +7678,7 @@
               <a:pPr>
                 <a:defRPr/>
               </a:pPr>
-              <a:t>27.02.2017</a:t>
+              <a:t>26.04.2017</a:t>
             </a:fld>
             <a:endParaRPr lang="ru-RU"/>
           </a:p>
@@ -7795,7 +7795,7 @@
               <a:pPr>
                 <a:defRPr/>
               </a:pPr>
-              <a:t>27.02.2017</a:t>
+              <a:t>26.04.2017</a:t>
             </a:fld>
             <a:endParaRPr lang="ru-RU"/>
           </a:p>
@@ -8092,7 +8092,7 @@
               <a:pPr>
                 <a:defRPr/>
               </a:pPr>
-              <a:t>27.02.2017</a:t>
+              <a:t>26.04.2017</a:t>
             </a:fld>
             <a:endParaRPr lang="ru-RU"/>
           </a:p>
@@ -8372,7 +8372,7 @@
               <a:pPr>
                 <a:defRPr/>
               </a:pPr>
-              <a:t>27.02.2017</a:t>
+              <a:t>26.04.2017</a:t>
             </a:fld>
             <a:endParaRPr lang="ru-RU"/>
           </a:p>
@@ -8631,7 +8631,7 @@
               <a:pPr>
                 <a:defRPr/>
               </a:pPr>
-              <a:t>27.02.2017</a:t>
+              <a:t>26.04.2017</a:t>
             </a:fld>
             <a:endParaRPr lang="ru-RU"/>
           </a:p>
@@ -9341,7 +9341,7 @@
                 <a:tabLst/>
                 <a:defRPr/>
               </a:pPr>
-              <a:t>27.02.2017</a:t>
+              <a:t>26.04.2017</a:t>
             </a:fld>
             <a:endParaRPr kumimoji="0" lang="ru-RU" sz="1200" b="0" i="0" u="none" strike="noStrike" kern="1200" cap="none" spc="0" normalizeH="0" baseline="0" noProof="0">
               <a:ln>
@@ -10889,36 +10889,6 @@
           </a:p>
         </p:txBody>
       </p:sp>
-      <p:pic>
-        <p:nvPicPr>
-          <p:cNvPr id="2" name="Picture 1"/>
-          <p:cNvPicPr>
-            <a:picLocks noChangeAspect="1"/>
-          </p:cNvPicPr>
-          <p:nvPr/>
-        </p:nvPicPr>
-        <p:blipFill>
-          <a:blip r:embed="rId3">
-            <a:extLst>
-              <a:ext uri="{28A0092B-C50C-407E-A947-70E740481C1C}">
-                <a14:useLocalDpi xmlns:a14="http://schemas.microsoft.com/office/drawing/2010/main" val="0"/>
-              </a:ext>
-            </a:extLst>
-          </a:blip>
-          <a:stretch>
-            <a:fillRect/>
-          </a:stretch>
-        </p:blipFill>
-        <p:spPr>
-          <a:xfrm>
-            <a:off x="1265238" y="1554624"/>
-            <a:ext cx="2847975" cy="2847975"/>
-          </a:xfrm>
-          <a:prstGeom prst="rect">
-            <a:avLst/>
-          </a:prstGeom>
-        </p:spPr>
-      </p:pic>
       <p:sp>
         <p:nvSpPr>
           <p:cNvPr id="22" name="Прямоугольник 1"/>
@@ -10994,7 +10964,7 @@
               <a:rPr lang="en-US" sz="2000" dirty="0">
                 <a:latin typeface="Segoe UI Light" pitchFamily="34" charset="0"/>
                 <a:cs typeface="Segoe UI Light" pitchFamily="34" charset="0"/>
-                <a:hlinkClick r:id="rId4"/>
+                <a:hlinkClick r:id="rId3"/>
               </a:rPr>
               <a:t>https://ua.linkedin.com/in/fnnzzz</a:t>
             </a:r>
@@ -11008,7 +10978,7 @@
               <a:rPr lang="en-US" sz="2000" dirty="0">
                 <a:latin typeface="Segoe UI Light" pitchFamily="34" charset="0"/>
                 <a:cs typeface="Segoe UI Light" pitchFamily="34" charset="0"/>
-                <a:hlinkClick r:id="rId5"/>
+                <a:hlinkClick r:id="rId4"/>
               </a:rPr>
               <a:t>https://github.com/fnnzzz</a:t>
             </a:r>
@@ -11173,7 +11143,7 @@
           <p:nvPr/>
         </p:nvPicPr>
         <p:blipFill>
-          <a:blip r:embed="rId6">
+          <a:blip r:embed="rId5">
             <a:extLst>
               <a:ext uri="{28A0092B-C50C-407E-A947-70E740481C1C}">
                 <a14:useLocalDpi xmlns:a14="http://schemas.microsoft.com/office/drawing/2010/main" val="0"/>
@@ -11188,6 +11158,29 @@
           <a:xfrm>
             <a:off x="5605746" y="2749353"/>
             <a:ext cx="2090454" cy="2090454"/>
+          </a:xfrm>
+          <a:prstGeom prst="rect">
+            <a:avLst/>
+          </a:prstGeom>
+        </p:spPr>
+      </p:pic>
+      <p:pic>
+        <p:nvPicPr>
+          <p:cNvPr id="17" name="Picture 16"/>
+          <p:cNvPicPr>
+            <a:picLocks noChangeAspect="1"/>
+          </p:cNvPicPr>
+          <p:nvPr/>
+        </p:nvPicPr>
+        <p:blipFill rotWithShape="1">
+          <a:blip r:embed="rId6"/>
+          <a:srcRect l="11033" t="8426" r="15120" b="8832"/>
+          <a:stretch/>
+        </p:blipFill>
+        <p:spPr>
+          <a:xfrm>
+            <a:off x="1358641" y="1720466"/>
+            <a:ext cx="2743200" cy="2743199"/>
           </a:xfrm>
           <a:prstGeom prst="rect">
             <a:avLst/>

</xml_diff>